<commit_message>
1.  Adding support for run test cases from Developer Command Prompt. 2.  Addding screenshots to the test cases. 3.  Updating documentation 4.  Supports for both Google Chrome and Microsoft Internet Explorer.
</commit_message>
<xml_diff>
--- a/docs/Mindbody_Design.pptx
+++ b/docs/Mindbody_Design.pptx
@@ -8,10 +8,10 @@
     <p:sldId id="256" r:id="rId2"/>
     <p:sldId id="258" r:id="rId3"/>
     <p:sldId id="260" r:id="rId4"/>
-    <p:sldId id="257" r:id="rId5"/>
-    <p:sldId id="259" r:id="rId6"/>
-    <p:sldId id="265" r:id="rId7"/>
-    <p:sldId id="261" r:id="rId8"/>
+    <p:sldId id="270" r:id="rId5"/>
+    <p:sldId id="257" r:id="rId6"/>
+    <p:sldId id="259" r:id="rId7"/>
+    <p:sldId id="265" r:id="rId8"/>
     <p:sldId id="264" r:id="rId9"/>
     <p:sldId id="262" r:id="rId10"/>
     <p:sldId id="268" r:id="rId11"/>
@@ -115,6 +115,11 @@
       </a:defRPr>
     </a:lvl9pPr>
   </p:defaultTextStyle>
+  <p:extLst>
+    <p:ext uri="{EFAFB233-063F-42B5-8137-9DF3F51BA10A}">
+      <p15:sldGuideLst xmlns:p15="http://schemas.microsoft.com/office/powerpoint/2012/main"/>
+    </p:ext>
+  </p:extLst>
 </p:presentation>
 </file>
 
@@ -432,7 +437,7 @@
           <a:p>
             <a:fld id="{78ABE3C1-DBE1-495D-B57B-2849774B866A}" type="datetimeFigureOut">
               <a:rPr lang="en-US" dirty="0"/>
-              <a:t>1/17/2017</a:t>
+              <a:t>1/19/2017</a:t>
             </a:fld>
             <a:endParaRPr lang="en-US" dirty="0"/>
           </a:p>
@@ -841,7 +846,7 @@
           <a:p>
             <a:fld id="{446C117F-5CCF-4837-BE5F-2B92066CAFAF}" type="datetimeFigureOut">
               <a:rPr lang="en-US" dirty="0"/>
-              <a:t>1/17/2017</a:t>
+              <a:t>1/19/2017</a:t>
             </a:fld>
             <a:endParaRPr lang="en-US" dirty="0"/>
           </a:p>
@@ -1172,7 +1177,7 @@
           <a:p>
             <a:fld id="{84EB90BD-B6CE-46B7-997F-7313B992CCDC}" type="datetimeFigureOut">
               <a:rPr lang="en-US" dirty="0"/>
-              <a:t>1/17/2017</a:t>
+              <a:t>1/19/2017</a:t>
             </a:fld>
             <a:endParaRPr lang="en-US" dirty="0"/>
           </a:p>
@@ -1572,7 +1577,7 @@
           <a:p>
             <a:fld id="{CDB9D11F-B188-461D-B23F-39381795C052}" type="datetimeFigureOut">
               <a:rPr lang="en-US" dirty="0"/>
-              <a:t>1/17/2017</a:t>
+              <a:t>1/19/2017</a:t>
             </a:fld>
             <a:endParaRPr lang="en-US" dirty="0"/>
           </a:p>
@@ -2135,7 +2140,7 @@
           <a:p>
             <a:fld id="{52E6D8D9-55A2-4063-B0F3-121F44549695}" type="datetimeFigureOut">
               <a:rPr lang="en-US" dirty="0"/>
-              <a:t>1/17/2017</a:t>
+              <a:t>1/19/2017</a:t>
             </a:fld>
             <a:endParaRPr lang="en-US" dirty="0"/>
           </a:p>
@@ -2811,7 +2816,7 @@
           <a:p>
             <a:fld id="{D4B24536-994D-4021-A283-9F449C0DB509}" type="datetimeFigureOut">
               <a:rPr lang="en-US" dirty="0"/>
-              <a:t>1/17/2017</a:t>
+              <a:t>1/19/2017</a:t>
             </a:fld>
             <a:endParaRPr lang="en-US" dirty="0"/>
           </a:p>
@@ -3719,7 +3724,7 @@
           <a:p>
             <a:fld id="{3CBBBB78-C96F-47B7-AB17-D852CA960AC9}" type="datetimeFigureOut">
               <a:rPr lang="en-US" dirty="0"/>
-              <a:t>1/17/2017</a:t>
+              <a:t>1/19/2017</a:t>
             </a:fld>
             <a:endParaRPr lang="en-US" dirty="0"/>
           </a:p>
@@ -4027,7 +4032,7 @@
           <a:p>
             <a:fld id="{1FA3F48C-C7C6-4055-9F49-3777875E72AE}" type="datetimeFigureOut">
               <a:rPr lang="en-US" dirty="0"/>
-              <a:t>1/17/2017</a:t>
+              <a:t>1/19/2017</a:t>
             </a:fld>
             <a:endParaRPr lang="en-US" dirty="0"/>
           </a:p>
@@ -4286,7 +4291,7 @@
           <a:p>
             <a:fld id="{6178E61D-D431-422C-9764-11DAFE33AB63}" type="datetimeFigureOut">
               <a:rPr lang="en-US" dirty="0"/>
-              <a:t>1/17/2017</a:t>
+              <a:t>1/19/2017</a:t>
             </a:fld>
             <a:endParaRPr lang="en-US" dirty="0"/>
           </a:p>
@@ -4605,7 +4610,7 @@
           <a:p>
             <a:fld id="{12DE42F4-6EEF-4EF7-8ED4-2208F0F89A08}" type="datetimeFigureOut">
               <a:rPr lang="en-US" dirty="0"/>
-              <a:t>1/17/2017</a:t>
+              <a:t>1/19/2017</a:t>
             </a:fld>
             <a:endParaRPr lang="en-US" dirty="0"/>
           </a:p>
@@ -4989,7 +4994,7 @@
           <a:p>
             <a:fld id="{30578ACC-22D6-47C1-A373-4FD133E34F3C}" type="datetimeFigureOut">
               <a:rPr lang="en-US" dirty="0"/>
-              <a:t>1/17/2017</a:t>
+              <a:t>1/19/2017</a:t>
             </a:fld>
             <a:endParaRPr lang="en-US" dirty="0"/>
           </a:p>
@@ -5360,7 +5365,7 @@
           <a:p>
             <a:fld id="{4E5A6C69-6797-4E8A-BF37-F2C3751466E9}" type="datetimeFigureOut">
               <a:rPr lang="en-US" dirty="0"/>
-              <a:t>1/17/2017</a:t>
+              <a:t>1/19/2017</a:t>
             </a:fld>
             <a:endParaRPr lang="en-US" dirty="0"/>
           </a:p>
@@ -5861,7 +5866,7 @@
           <a:p>
             <a:fld id="{D82014A1-A632-4878-A0D3-F52BA7563730}" type="datetimeFigureOut">
               <a:rPr lang="en-US" dirty="0"/>
-              <a:t>1/17/2017</a:t>
+              <a:t>1/19/2017</a:t>
             </a:fld>
             <a:endParaRPr lang="en-US" dirty="0"/>
           </a:p>
@@ -6113,7 +6118,7 @@
           <a:p>
             <a:fld id="{CE99F462-093F-4566-844B-4C71F2739DA5}" type="datetimeFigureOut">
               <a:rPr lang="en-US" dirty="0"/>
-              <a:t>1/17/2017</a:t>
+              <a:t>1/19/2017</a:t>
             </a:fld>
             <a:endParaRPr lang="en-US" dirty="0"/>
           </a:p>
@@ -6271,7 +6276,7 @@
           <a:p>
             <a:fld id="{3D24A7AC-904D-4781-85BA-7D10C17ED021}" type="datetimeFigureOut">
               <a:rPr lang="en-US" dirty="0"/>
-              <a:t>1/17/2017</a:t>
+              <a:t>1/19/2017</a:t>
             </a:fld>
             <a:endParaRPr lang="en-US" dirty="0"/>
           </a:p>
@@ -6656,7 +6661,7 @@
           <a:p>
             <a:fld id="{E331444B-B92B-4E27-8C94-BB93EAF5CB18}" type="datetimeFigureOut">
               <a:rPr lang="en-US" dirty="0"/>
-              <a:t>1/17/2017</a:t>
+              <a:t>1/19/2017</a:t>
             </a:fld>
             <a:endParaRPr lang="en-US" dirty="0"/>
           </a:p>
@@ -7060,7 +7065,7 @@
           <a:p>
             <a:fld id="{363EFA5E-FA76-400D-B3DC-F0BA90E6D107}" type="datetimeFigureOut">
               <a:rPr lang="en-US" dirty="0"/>
-              <a:t>1/17/2017</a:t>
+              <a:t>1/19/2017</a:t>
             </a:fld>
             <a:endParaRPr lang="en-US" dirty="0"/>
           </a:p>
@@ -7299,7 +7304,7 @@
           <a:p>
             <a:fld id="{9D6E9DEC-419B-4CC5-A080-3B06BD5A8291}" type="datetimeFigureOut">
               <a:rPr lang="en-US" dirty="0"/>
-              <a:t>1/17/2017</a:t>
+              <a:t>1/19/2017</a:t>
             </a:fld>
             <a:endParaRPr lang="en-US" dirty="0"/>
           </a:p>
@@ -8106,6 +8111,30 @@
           </a:p>
         </p:txBody>
       </p:sp>
+      <p:pic>
+        <p:nvPicPr>
+          <p:cNvPr id="5" name="Picture 4"/>
+          <p:cNvPicPr>
+            <a:picLocks noChangeAspect="1"/>
+          </p:cNvPicPr>
+          <p:nvPr/>
+        </p:nvPicPr>
+        <p:blipFill>
+          <a:blip r:embed="rId5"/>
+          <a:stretch>
+            <a:fillRect/>
+          </a:stretch>
+        </p:blipFill>
+        <p:spPr>
+          <a:xfrm>
+            <a:off x="811318" y="3804406"/>
+            <a:ext cx="6253398" cy="2674458"/>
+          </a:xfrm>
+          <a:prstGeom prst="rect">
+            <a:avLst/>
+          </a:prstGeom>
+        </p:spPr>
+      </p:pic>
     </p:spTree>
     <p:extLst>
       <p:ext uri="{BB962C8B-B14F-4D97-AF65-F5344CB8AC3E}">
@@ -8191,7 +8220,7 @@
       </p:pic>
       <p:pic>
         <p:nvPicPr>
-          <p:cNvPr id="9" name="Picture 8"/>
+          <p:cNvPr id="23" name="Picture 22"/>
           <p:cNvPicPr>
             <a:picLocks noChangeAspect="1"/>
           </p:cNvPicPr>
@@ -8205,17 +8234,176 @@
         </p:blipFill>
         <p:spPr>
           <a:xfrm>
-            <a:off x="7724041" y="2587686"/>
-            <a:ext cx="1943100" cy="1704975"/>
+            <a:off x="6372841" y="5117123"/>
+            <a:ext cx="4645501" cy="1521802"/>
           </a:xfrm>
           <a:prstGeom prst="rect">
             <a:avLst/>
           </a:prstGeom>
         </p:spPr>
       </p:pic>
+      <p:cxnSp>
+        <p:nvCxnSpPr>
+          <p:cNvPr id="32" name="Straight Arrow Connector 31"/>
+          <p:cNvCxnSpPr>
+            <a:cxnSpLocks/>
+            <a:stCxn id="7" idx="3"/>
+          </p:cNvCxnSpPr>
+          <p:nvPr/>
+        </p:nvCxnSpPr>
+        <p:spPr>
+          <a:xfrm flipV="1">
+            <a:off x="5002947" y="3440174"/>
+            <a:ext cx="2721094" cy="1"/>
+          </a:xfrm>
+          <a:prstGeom prst="straightConnector1">
+            <a:avLst/>
+          </a:prstGeom>
+          <a:ln>
+            <a:tailEnd type="triangle"/>
+          </a:ln>
+        </p:spPr>
+        <p:style>
+          <a:lnRef idx="1">
+            <a:schemeClr val="accent1"/>
+          </a:lnRef>
+          <a:fillRef idx="0">
+            <a:schemeClr val="accent1"/>
+          </a:fillRef>
+          <a:effectRef idx="0">
+            <a:schemeClr val="accent1"/>
+          </a:effectRef>
+          <a:fontRef idx="minor">
+            <a:schemeClr val="tx1"/>
+          </a:fontRef>
+        </p:style>
+      </p:cxnSp>
+      <p:cxnSp>
+        <p:nvCxnSpPr>
+          <p:cNvPr id="48" name="Straight Arrow Connector 47"/>
+          <p:cNvCxnSpPr>
+            <a:cxnSpLocks/>
+            <a:endCxn id="23" idx="0"/>
+          </p:cNvCxnSpPr>
+          <p:nvPr/>
+        </p:nvCxnSpPr>
+        <p:spPr>
+          <a:xfrm>
+            <a:off x="8695591" y="4292661"/>
+            <a:ext cx="1" cy="824462"/>
+          </a:xfrm>
+          <a:prstGeom prst="straightConnector1">
+            <a:avLst/>
+          </a:prstGeom>
+          <a:ln>
+            <a:tailEnd type="triangle"/>
+          </a:ln>
+        </p:spPr>
+        <p:style>
+          <a:lnRef idx="1">
+            <a:schemeClr val="accent1"/>
+          </a:lnRef>
+          <a:fillRef idx="0">
+            <a:schemeClr val="accent1"/>
+          </a:fillRef>
+          <a:effectRef idx="0">
+            <a:schemeClr val="accent1"/>
+          </a:effectRef>
+          <a:fontRef idx="minor">
+            <a:schemeClr val="tx1"/>
+          </a:fontRef>
+        </p:style>
+      </p:cxnSp>
+      <p:sp>
+        <p:nvSpPr>
+          <p:cNvPr id="49" name="TextBox 48"/>
+          <p:cNvSpPr txBox="1"/>
+          <p:nvPr/>
+        </p:nvSpPr>
+        <p:spPr>
+          <a:xfrm>
+            <a:off x="6363494" y="1947892"/>
+            <a:ext cx="5006499" cy="369332"/>
+          </a:xfrm>
+          <a:prstGeom prst="rect">
+            <a:avLst/>
+          </a:prstGeom>
+          <a:noFill/>
+        </p:spPr>
+        <p:txBody>
+          <a:bodyPr wrap="none" rtlCol="0">
+            <a:spAutoFit/>
+          </a:bodyPr>
+          <a:lstStyle/>
+          <a:p>
+            <a:r>
+              <a:rPr lang="en-US" dirty="0"/>
+              <a:t>Operations and flows in UI are managed here </a:t>
+            </a:r>
+          </a:p>
+        </p:txBody>
+      </p:sp>
+      <p:sp>
+        <p:nvSpPr>
+          <p:cNvPr id="50" name="TextBox 49"/>
+          <p:cNvSpPr txBox="1"/>
+          <p:nvPr/>
+        </p:nvSpPr>
+        <p:spPr>
+          <a:xfrm>
+            <a:off x="680321" y="4721414"/>
+            <a:ext cx="3898503" cy="369332"/>
+          </a:xfrm>
+          <a:prstGeom prst="rect">
+            <a:avLst/>
+          </a:prstGeom>
+          <a:noFill/>
+        </p:spPr>
+        <p:txBody>
+          <a:bodyPr wrap="none" rtlCol="0">
+            <a:spAutoFit/>
+          </a:bodyPr>
+          <a:lstStyle/>
+          <a:p>
+            <a:r>
+              <a:rPr lang="en-US" dirty="0"/>
+              <a:t>Verification is managed here (Tests)</a:t>
+            </a:r>
+          </a:p>
+        </p:txBody>
+      </p:sp>
+      <p:sp>
+        <p:nvSpPr>
+          <p:cNvPr id="51" name="TextBox 50"/>
+          <p:cNvSpPr txBox="1"/>
+          <p:nvPr/>
+        </p:nvSpPr>
+        <p:spPr>
+          <a:xfrm>
+            <a:off x="10439337" y="4747791"/>
+            <a:ext cx="579005" cy="369332"/>
+          </a:xfrm>
+          <a:prstGeom prst="rect">
+            <a:avLst/>
+          </a:prstGeom>
+          <a:noFill/>
+        </p:spPr>
+        <p:txBody>
+          <a:bodyPr wrap="none" rtlCol="0">
+            <a:spAutoFit/>
+          </a:bodyPr>
+          <a:lstStyle/>
+          <a:p>
+            <a:r>
+              <a:rPr lang="en-US" dirty="0"/>
+              <a:t>SUT</a:t>
+            </a:r>
+          </a:p>
+        </p:txBody>
+      </p:sp>
       <p:pic>
         <p:nvPicPr>
-          <p:cNvPr id="23" name="Picture 22"/>
+          <p:cNvPr id="3" name="Picture 2"/>
           <p:cNvPicPr>
             <a:picLocks noChangeAspect="1"/>
           </p:cNvPicPr>
@@ -8229,173 +8417,14 @@
         </p:blipFill>
         <p:spPr>
           <a:xfrm>
-            <a:off x="6372841" y="5117123"/>
-            <a:ext cx="4645501" cy="1521802"/>
+            <a:off x="7724041" y="2309391"/>
+            <a:ext cx="1943100" cy="2438400"/>
           </a:xfrm>
           <a:prstGeom prst="rect">
             <a:avLst/>
           </a:prstGeom>
         </p:spPr>
       </p:pic>
-      <p:cxnSp>
-        <p:nvCxnSpPr>
-          <p:cNvPr id="32" name="Straight Arrow Connector 31"/>
-          <p:cNvCxnSpPr>
-            <a:stCxn id="7" idx="3"/>
-            <a:endCxn id="9" idx="1"/>
-          </p:cNvCxnSpPr>
-          <p:nvPr/>
-        </p:nvCxnSpPr>
-        <p:spPr>
-          <a:xfrm flipV="1">
-            <a:off x="5002947" y="3440174"/>
-            <a:ext cx="2721094" cy="1"/>
-          </a:xfrm>
-          <a:prstGeom prst="straightConnector1">
-            <a:avLst/>
-          </a:prstGeom>
-          <a:ln>
-            <a:tailEnd type="triangle"/>
-          </a:ln>
-        </p:spPr>
-        <p:style>
-          <a:lnRef idx="1">
-            <a:schemeClr val="accent1"/>
-          </a:lnRef>
-          <a:fillRef idx="0">
-            <a:schemeClr val="accent1"/>
-          </a:fillRef>
-          <a:effectRef idx="0">
-            <a:schemeClr val="accent1"/>
-          </a:effectRef>
-          <a:fontRef idx="minor">
-            <a:schemeClr val="tx1"/>
-          </a:fontRef>
-        </p:style>
-      </p:cxnSp>
-      <p:cxnSp>
-        <p:nvCxnSpPr>
-          <p:cNvPr id="48" name="Straight Arrow Connector 47"/>
-          <p:cNvCxnSpPr>
-            <a:stCxn id="9" idx="2"/>
-            <a:endCxn id="23" idx="0"/>
-          </p:cNvCxnSpPr>
-          <p:nvPr/>
-        </p:nvCxnSpPr>
-        <p:spPr>
-          <a:xfrm>
-            <a:off x="8695591" y="4292661"/>
-            <a:ext cx="1" cy="824462"/>
-          </a:xfrm>
-          <a:prstGeom prst="straightConnector1">
-            <a:avLst/>
-          </a:prstGeom>
-          <a:ln>
-            <a:tailEnd type="triangle"/>
-          </a:ln>
-        </p:spPr>
-        <p:style>
-          <a:lnRef idx="1">
-            <a:schemeClr val="accent1"/>
-          </a:lnRef>
-          <a:fillRef idx="0">
-            <a:schemeClr val="accent1"/>
-          </a:fillRef>
-          <a:effectRef idx="0">
-            <a:schemeClr val="accent1"/>
-          </a:effectRef>
-          <a:fontRef idx="minor">
-            <a:schemeClr val="tx1"/>
-          </a:fontRef>
-        </p:style>
-      </p:cxnSp>
-      <p:sp>
-        <p:nvSpPr>
-          <p:cNvPr id="49" name="TextBox 48"/>
-          <p:cNvSpPr txBox="1"/>
-          <p:nvPr/>
-        </p:nvSpPr>
-        <p:spPr>
-          <a:xfrm>
-            <a:off x="6372841" y="2218354"/>
-            <a:ext cx="5006499" cy="369332"/>
-          </a:xfrm>
-          <a:prstGeom prst="rect">
-            <a:avLst/>
-          </a:prstGeom>
-          <a:noFill/>
-        </p:spPr>
-        <p:txBody>
-          <a:bodyPr wrap="none" rtlCol="0">
-            <a:spAutoFit/>
-          </a:bodyPr>
-          <a:lstStyle/>
-          <a:p>
-            <a:r>
-              <a:rPr lang="en-US" dirty="0"/>
-              <a:t>Operations and flows in UI are managed here </a:t>
-            </a:r>
-          </a:p>
-        </p:txBody>
-      </p:sp>
-      <p:sp>
-        <p:nvSpPr>
-          <p:cNvPr id="50" name="TextBox 49"/>
-          <p:cNvSpPr txBox="1"/>
-          <p:nvPr/>
-        </p:nvSpPr>
-        <p:spPr>
-          <a:xfrm>
-            <a:off x="680321" y="4721414"/>
-            <a:ext cx="3898503" cy="369332"/>
-          </a:xfrm>
-          <a:prstGeom prst="rect">
-            <a:avLst/>
-          </a:prstGeom>
-          <a:noFill/>
-        </p:spPr>
-        <p:txBody>
-          <a:bodyPr wrap="none" rtlCol="0">
-            <a:spAutoFit/>
-          </a:bodyPr>
-          <a:lstStyle/>
-          <a:p>
-            <a:r>
-              <a:rPr lang="en-US" dirty="0"/>
-              <a:t>Verification is managed here (Tests)</a:t>
-            </a:r>
-          </a:p>
-        </p:txBody>
-      </p:sp>
-      <p:sp>
-        <p:nvSpPr>
-          <p:cNvPr id="51" name="TextBox 50"/>
-          <p:cNvSpPr txBox="1"/>
-          <p:nvPr/>
-        </p:nvSpPr>
-        <p:spPr>
-          <a:xfrm>
-            <a:off x="10439337" y="4747791"/>
-            <a:ext cx="579005" cy="369332"/>
-          </a:xfrm>
-          <a:prstGeom prst="rect">
-            <a:avLst/>
-          </a:prstGeom>
-          <a:noFill/>
-        </p:spPr>
-        <p:txBody>
-          <a:bodyPr wrap="none" rtlCol="0">
-            <a:spAutoFit/>
-          </a:bodyPr>
-          <a:lstStyle/>
-          <a:p>
-            <a:r>
-              <a:rPr lang="en-US" dirty="0"/>
-              <a:t>SUT</a:t>
-            </a:r>
-          </a:p>
-        </p:txBody>
-      </p:sp>
     </p:spTree>
     <p:extLst>
       <p:ext uri="{BB962C8B-B14F-4D97-AF65-F5344CB8AC3E}">
@@ -8677,46 +8706,238 @@
           <a:chExt cx="0" cy="0"/>
         </a:xfrm>
       </p:grpSpPr>
-      <p:sp>
-        <p:nvSpPr>
-          <p:cNvPr id="2" name="Title 1"/>
-          <p:cNvSpPr>
-            <a:spLocks noGrp="1"/>
-          </p:cNvSpPr>
-          <p:nvPr>
-            <p:ph type="title"/>
-          </p:nvPr>
-        </p:nvSpPr>
-        <p:spPr/>
-        <p:txBody>
-          <a:bodyPr/>
-          <a:lstStyle/>
-          <a:p>
-            <a:r>
-              <a:rPr lang="en-US" dirty="0"/>
-              <a:t>The System Under Test (SUT)</a:t>
-            </a:r>
-          </a:p>
-        </p:txBody>
-      </p:sp>
+      <p:grpSp>
+        <p:nvGrpSpPr>
+          <p:cNvPr id="68" name="Group 67"/>
+          <p:cNvGrpSpPr>
+            <a:grpSpLocks noGrp="1" noUngrp="1" noRot="1" noChangeAspect="1" noMove="1" noResize="1"/>
+          </p:cNvGrpSpPr>
+          <p:nvPr>
+            <p:extLst>
+              <p:ext uri="{386F3935-93C4-4BCD-93E2-E3B085C9AB24}">
+                <p16:designElem xmlns:p16="http://schemas.microsoft.com/office/powerpoint/2015/main" val="1"/>
+              </p:ext>
+            </p:extLst>
+          </p:nvPr>
+        </p:nvGrpSpPr>
+        <p:grpSpPr>
+          <a:xfrm>
+            <a:off x="-3176" y="0"/>
+            <a:ext cx="12192000" cy="6858001"/>
+            <a:chOff x="-3176" y="0"/>
+            <a:chExt cx="12192000" cy="6858001"/>
+          </a:xfrm>
+        </p:grpSpPr>
+        <p:sp useBgFill="1">
+          <p:nvSpPr>
+            <p:cNvPr id="69" name="Rectangle 68"/>
+            <p:cNvSpPr/>
+            <p:nvPr>
+              <p:extLst>
+                <p:ext uri="{386F3935-93C4-4BCD-93E2-E3B085C9AB24}">
+                  <p16:designElem xmlns:p16="http://schemas.microsoft.com/office/powerpoint/2015/main" val="1"/>
+                </p:ext>
+              </p:extLst>
+            </p:nvPr>
+          </p:nvSpPr>
+          <p:spPr>
+            <a:xfrm>
+              <a:off x="0" y="0"/>
+              <a:ext cx="12188824" cy="6858001"/>
+            </a:xfrm>
+            <a:prstGeom prst="rect">
+              <a:avLst/>
+            </a:prstGeom>
+            <a:ln>
+              <a:noFill/>
+            </a:ln>
+          </p:spPr>
+          <p:style>
+            <a:lnRef idx="2">
+              <a:schemeClr val="accent1">
+                <a:shade val="50000"/>
+              </a:schemeClr>
+            </a:lnRef>
+            <a:fillRef idx="1">
+              <a:schemeClr val="accent1"/>
+            </a:fillRef>
+            <a:effectRef idx="0">
+              <a:schemeClr val="accent1"/>
+            </a:effectRef>
+            <a:fontRef idx="minor">
+              <a:schemeClr val="lt1"/>
+            </a:fontRef>
+          </p:style>
+          <p:txBody>
+            <a:bodyPr rtlCol="0" anchor="ctr"/>
+            <a:lstStyle/>
+            <a:p>
+              <a:pPr algn="ctr"/>
+              <a:endParaRPr lang="en-US"/>
+            </a:p>
+          </p:txBody>
+        </p:sp>
+        <p:pic>
+          <p:nvPicPr>
+            <p:cNvPr id="70" name="Picture 69"/>
+            <p:cNvPicPr>
+              <a:picLocks noChangeAspect="1"/>
+            </p:cNvPicPr>
+            <p:nvPr>
+              <p:extLst>
+                <p:ext uri="{386F3935-93C4-4BCD-93E2-E3B085C9AB24}">
+                  <p16:designElem xmlns:p16="http://schemas.microsoft.com/office/powerpoint/2015/main" val="1"/>
+                </p:ext>
+              </p:extLst>
+            </p:nvPr>
+          </p:nvPicPr>
+          <p:blipFill>
+            <a:blip r:embed="rId2">
+              <a:alphaModFix amt="10000"/>
+              <a:extLst>
+                <a:ext uri="{28A0092B-C50C-407E-A947-70E740481C1C}">
+                  <a14:useLocalDpi xmlns:a14="http://schemas.microsoft.com/office/drawing/2010/main" val="0"/>
+                </a:ext>
+              </a:extLst>
+            </a:blip>
+            <a:stretch>
+              <a:fillRect/>
+            </a:stretch>
+          </p:blipFill>
+          <p:spPr>
+            <a:xfrm>
+              <a:off x="-3176" y="0"/>
+              <a:ext cx="12192000" cy="6858000"/>
+            </a:xfrm>
+            <a:prstGeom prst="rect">
+              <a:avLst/>
+            </a:prstGeom>
+          </p:spPr>
+        </p:pic>
+      </p:grpSp>
       <p:pic>
         <p:nvPicPr>
-          <p:cNvPr id="5" name="Picture Placeholder 4"/>
+          <p:cNvPr id="1026" name="Picture 2" descr="https://lh5.googleusercontent.com/-dZP4xffGU1U/VA7dwiVCO9I/AAAAAAAACsA/lAy7YE4O_9c/w523-h542-no/selenium-webdriver-workflow.jpg"/>
           <p:cNvPicPr>
-            <a:picLocks noGrp="1" noChangeAspect="1"/>
+            <a:picLocks noChangeAspect="1" noChangeArrowheads="1"/>
           </p:cNvPicPr>
-          <p:nvPr>
-            <p:ph type="pic" idx="1"/>
+          <p:nvPr/>
+        </p:nvPicPr>
+        <p:blipFill rotWithShape="1">
+          <a:blip r:embed="rId3">
+            <a:extLst>
+              <a:ext uri="{28A0092B-C50C-407E-A947-70E740481C1C}">
+                <a14:useLocalDpi xmlns:a14="http://schemas.microsoft.com/office/drawing/2010/main" val="0"/>
+              </a:ext>
+            </a:extLst>
+          </a:blip>
+          <a:srcRect r="7914" b="1"/>
+          <a:stretch/>
+        </p:blipFill>
+        <p:spPr bwMode="auto">
+          <a:xfrm>
+            <a:off x="6096000" y="10"/>
+            <a:ext cx="6092823" cy="6856310"/>
+          </a:xfrm>
+          <a:prstGeom prst="rect">
+            <a:avLst/>
+          </a:prstGeom>
+          <a:noFill/>
+          <a:ln>
+            <a:noFill/>
+          </a:ln>
+          <a:effectLst/>
+          <a:extLst>
+            <a:ext uri="{909E8E84-426E-40DD-AFC4-6F175D3DCCD1}">
+              <a14:hiddenFill xmlns:a14="http://schemas.microsoft.com/office/drawing/2010/main">
+                <a:solidFill>
+                  <a:srgbClr val="FFFFFF"/>
+                </a:solidFill>
+              </a14:hiddenFill>
+            </a:ext>
+          </a:extLst>
+        </p:spPr>
+      </p:pic>
+      <p:sp>
+        <p:nvSpPr>
+          <p:cNvPr id="71" name="Rectangle 70"/>
+          <p:cNvSpPr>
+            <a:spLocks noGrp="1" noRot="1" noChangeAspect="1" noMove="1" noResize="1" noEditPoints="1" noAdjustHandles="1" noChangeArrowheads="1" noChangeShapeType="1" noTextEdit="1"/>
+          </p:cNvSpPr>
+          <p:nvPr>
+            <p:extLst>
+              <p:ext uri="{386F3935-93C4-4BCD-93E2-E3B085C9AB24}">
+                <p16:designElem xmlns:p16="http://schemas.microsoft.com/office/powerpoint/2015/main" val="1"/>
+              </p:ext>
+            </p:extLst>
+          </p:nvPr>
+        </p:nvSpPr>
+        <p:spPr bwMode="grayWhite">
+          <a:xfrm>
+            <a:off x="2" y="609600"/>
+            <a:ext cx="6499753" cy="1368198"/>
+          </a:xfrm>
+          <a:prstGeom prst="rect">
+            <a:avLst/>
+          </a:prstGeom>
+          <a:solidFill>
+            <a:schemeClr val="bg1">
+              <a:lumMod val="85000"/>
+              <a:lumOff val="15000"/>
+            </a:schemeClr>
+          </a:solidFill>
+          <a:ln>
+            <a:noFill/>
+          </a:ln>
+        </p:spPr>
+        <p:style>
+          <a:lnRef idx="2">
+            <a:schemeClr val="accent1">
+              <a:shade val="50000"/>
+            </a:schemeClr>
+          </a:lnRef>
+          <a:fillRef idx="1">
+            <a:schemeClr val="accent1"/>
+          </a:fillRef>
+          <a:effectRef idx="0">
+            <a:schemeClr val="accent1"/>
+          </a:effectRef>
+          <a:fontRef idx="minor">
+            <a:schemeClr val="lt1"/>
+          </a:fontRef>
+        </p:style>
+      </p:sp>
+      <p:pic>
+        <p:nvPicPr>
+          <p:cNvPr id="72" name="Picture 71"/>
+          <p:cNvPicPr>
+            <a:picLocks noGrp="1" noRot="1" noChangeAspect="1" noMove="1" noResize="1" noEditPoints="1" noAdjustHandles="1" noChangeArrowheads="1" noChangeShapeType="1" noCrop="1"/>
+          </p:cNvPicPr>
+          <p:nvPr>
+            <p:extLst>
+              <p:ext uri="{386F3935-93C4-4BCD-93E2-E3B085C9AB24}">
+                <p16:designElem xmlns:p16="http://schemas.microsoft.com/office/powerpoint/2015/main" val="1"/>
+              </p:ext>
+            </p:extLst>
           </p:nvPr>
         </p:nvPicPr>
         <p:blipFill>
-          <a:blip r:embed="rId2"/>
-          <a:srcRect t="3942" b="3942"/>
+          <a:blip r:embed="rId4">
+            <a:extLst>
+              <a:ext uri="{28A0092B-C50C-407E-A947-70E740481C1C}">
+                <a14:useLocalDpi xmlns:a14="http://schemas.microsoft.com/office/drawing/2010/main" val="0"/>
+              </a:ext>
+            </a:extLst>
+          </a:blip>
           <a:stretch>
             <a:fillRect/>
           </a:stretch>
         </p:blipFill>
         <p:spPr>
+          <a:xfrm>
+            <a:off x="2" y="1970240"/>
+            <a:ext cx="6492240" cy="261714"/>
+          </a:xfrm>
           <a:prstGeom prst="rect">
             <a:avLst/>
           </a:prstGeom>
@@ -8724,25 +8945,127 @@
       </p:pic>
       <p:sp>
         <p:nvSpPr>
-          <p:cNvPr id="4" name="Text Placeholder 3"/>
-          <p:cNvSpPr>
-            <a:spLocks noGrp="1"/>
-          </p:cNvSpPr>
-          <p:nvPr>
-            <p:ph type="body" sz="half" idx="2"/>
-          </p:nvPr>
-        </p:nvSpPr>
-        <p:spPr/>
-        <p:txBody>
-          <a:bodyPr/>
+          <p:cNvPr id="2" name="Title 1"/>
+          <p:cNvSpPr>
+            <a:spLocks noGrp="1"/>
+          </p:cNvSpPr>
+          <p:nvPr>
+            <p:ph type="title"/>
+          </p:nvPr>
+        </p:nvSpPr>
+        <p:spPr>
+          <a:xfrm>
+            <a:off x="680321" y="753228"/>
+            <a:ext cx="5041629" cy="1080938"/>
+          </a:xfrm>
+        </p:spPr>
+        <p:txBody>
+          <a:bodyPr>
+            <a:normAutofit/>
+          </a:bodyPr>
           <a:lstStyle/>
           <a:p>
             <a:r>
-              <a:rPr lang="en-US" dirty="0">
-                <a:hlinkClick r:id="rId3"/>
-              </a:rPr>
-              <a:t>Parking Calculator</a:t>
-            </a:r>
+              <a:rPr lang="en-US" dirty="0"/>
+              <a:t>Automation Framework </a:t>
+            </a:r>
+          </a:p>
+        </p:txBody>
+      </p:sp>
+      <p:sp>
+        <p:nvSpPr>
+          <p:cNvPr id="3" name="Content Placeholder 2"/>
+          <p:cNvSpPr>
+            <a:spLocks noGrp="1"/>
+          </p:cNvSpPr>
+          <p:nvPr>
+            <p:ph idx="1"/>
+          </p:nvPr>
+        </p:nvSpPr>
+        <p:spPr>
+          <a:xfrm>
+            <a:off x="680322" y="2336873"/>
+            <a:ext cx="5041628" cy="3599316"/>
+          </a:xfrm>
+        </p:spPr>
+        <p:txBody>
+          <a:bodyPr>
+            <a:normAutofit fontScale="92500" lnSpcReduction="20000"/>
+          </a:bodyPr>
+          <a:lstStyle/>
+          <a:p>
+            <a:r>
+              <a:rPr lang="en-US" sz="2000" dirty="0"/>
+              <a:t>Microsoft Visual Studio Community 2015</a:t>
+            </a:r>
+          </a:p>
+          <a:p>
+            <a:r>
+              <a:rPr lang="en-US" sz="2000" dirty="0"/>
+              <a:t>Version 14.0.25425.01 Update 3</a:t>
+            </a:r>
+          </a:p>
+          <a:p>
+            <a:r>
+              <a:rPr lang="en-US" sz="2000" dirty="0"/>
+              <a:t>Microsoft .NET Framework</a:t>
+            </a:r>
+          </a:p>
+          <a:p>
+            <a:r>
+              <a:rPr lang="en-US" sz="2000" dirty="0"/>
+              <a:t>Version 4.6.01055</a:t>
+            </a:r>
+          </a:p>
+          <a:p>
+            <a:r>
+              <a:rPr lang="en-US" sz="2000" dirty="0"/>
+              <a:t>Programming </a:t>
+            </a:r>
+            <a:r>
+              <a:rPr lang="en-US" sz="2000" dirty="0" err="1"/>
+              <a:t>Languague</a:t>
+            </a:r>
+            <a:r>
+              <a:rPr lang="en-US" sz="2000" dirty="0"/>
+              <a:t>: C#</a:t>
+            </a:r>
+          </a:p>
+          <a:p>
+            <a:endParaRPr lang="en-US" sz="2000" dirty="0"/>
+          </a:p>
+          <a:p>
+            <a:r>
+              <a:rPr lang="en-US" sz="2000" dirty="0"/>
+              <a:t>.Testing Framework</a:t>
+            </a:r>
+          </a:p>
+          <a:p>
+            <a:pPr lvl="1"/>
+            <a:r>
+              <a:rPr lang="en-US" dirty="0"/>
+              <a:t>MS Test</a:t>
+            </a:r>
+          </a:p>
+          <a:p>
+            <a:pPr lvl="1"/>
+            <a:r>
+              <a:rPr lang="en-US" dirty="0"/>
+              <a:t>Selenium WebDriver for C#</a:t>
+            </a:r>
+          </a:p>
+          <a:p>
+            <a:pPr lvl="1"/>
+            <a:endParaRPr lang="en-US" dirty="0"/>
+          </a:p>
+          <a:p>
+            <a:r>
+              <a:rPr lang="en-US" sz="2000" dirty="0"/>
+              <a:t>Design Patterns: POM</a:t>
+            </a:r>
+          </a:p>
+          <a:p>
+            <a:pPr lvl="1"/>
             <a:endParaRPr lang="en-US" dirty="0"/>
           </a:p>
         </p:txBody>
@@ -8750,7 +9073,7 @@
     </p:spTree>
     <p:extLst>
       <p:ext uri="{BB962C8B-B14F-4D97-AF65-F5344CB8AC3E}">
-        <p14:creationId xmlns:p14="http://schemas.microsoft.com/office/powerpoint/2010/main" val="2606505764"/>
+        <p14:creationId xmlns:p14="http://schemas.microsoft.com/office/powerpoint/2010/main" val="2706452580"/>
       </p:ext>
     </p:extLst>
   </p:cSld>
@@ -8794,93 +9117,34 @@
           <a:p>
             <a:r>
               <a:rPr lang="en-US" dirty="0"/>
-              <a:t>Architecture</a:t>
-            </a:r>
-          </a:p>
-        </p:txBody>
-      </p:sp>
-      <p:sp>
-        <p:nvSpPr>
-          <p:cNvPr id="3" name="Content Placeholder 2"/>
-          <p:cNvSpPr>
-            <a:spLocks noGrp="1"/>
-          </p:cNvSpPr>
-          <p:nvPr>
-            <p:ph idx="1"/>
-          </p:nvPr>
-        </p:nvSpPr>
-        <p:spPr/>
-        <p:txBody>
-          <a:bodyPr>
-            <a:normAutofit lnSpcReduction="10000"/>
-          </a:bodyPr>
-          <a:lstStyle/>
-          <a:p>
-            <a:r>
-              <a:rPr lang="en-US" dirty="0"/>
-              <a:t>The web application is the SUT.</a:t>
-            </a:r>
-          </a:p>
-          <a:p>
-            <a:endParaRPr lang="en-US" dirty="0"/>
-          </a:p>
-          <a:p>
-            <a:r>
-              <a:rPr lang="en-US" dirty="0"/>
-              <a:t>The Automation Framework is directly tied to Selenium and implements Page Object Model (</a:t>
-            </a:r>
-            <a:r>
-              <a:rPr lang="en-US" b="1" dirty="0"/>
-              <a:t>operations and flows in the UI)</a:t>
-            </a:r>
-            <a:r>
-              <a:rPr lang="en-US" dirty="0"/>
-              <a:t>.</a:t>
-            </a:r>
-          </a:p>
-          <a:p>
-            <a:endParaRPr lang="en-US" dirty="0"/>
-          </a:p>
-          <a:p>
-            <a:r>
-              <a:rPr lang="en-US" dirty="0"/>
-              <a:t>Test cases could use any testing framework (e.g.: </a:t>
-            </a:r>
-            <a:r>
-              <a:rPr lang="en-US" dirty="0" err="1"/>
-              <a:t>Nunit</a:t>
-            </a:r>
-            <a:r>
-              <a:rPr lang="en-US" dirty="0"/>
-              <a:t>, </a:t>
-            </a:r>
-            <a:r>
-              <a:rPr lang="en-US" dirty="0" err="1"/>
-              <a:t>MSTest</a:t>
-            </a:r>
-            <a:r>
-              <a:rPr lang="en-US" dirty="0"/>
-              <a:t>, </a:t>
-            </a:r>
-            <a:r>
-              <a:rPr lang="en-US" dirty="0" err="1"/>
-              <a:t>xUnit</a:t>
-            </a:r>
-            <a:r>
-              <a:rPr lang="en-US" dirty="0"/>
-              <a:t> </a:t>
-            </a:r>
-            <a:r>
-              <a:rPr lang="en-US" dirty="0" err="1"/>
-              <a:t>.Net</a:t>
-            </a:r>
-            <a:r>
-              <a:rPr lang="en-US" dirty="0"/>
-              <a:t>) for verification.</a:t>
-            </a:r>
-          </a:p>
-        </p:txBody>
-      </p:sp>
+              <a:t>The System Under Test (SUT)</a:t>
+            </a:r>
+          </a:p>
+        </p:txBody>
+      </p:sp>
+      <p:pic>
+        <p:nvPicPr>
+          <p:cNvPr id="5" name="Picture Placeholder 4"/>
+          <p:cNvPicPr>
+            <a:picLocks noGrp="1" noChangeAspect="1"/>
+          </p:cNvPicPr>
+          <p:nvPr>
+            <p:ph type="pic" idx="1"/>
+          </p:nvPr>
+        </p:nvPicPr>
+        <p:blipFill>
+          <a:blip r:embed="rId2"/>
+          <a:srcRect t="3942" b="3942"/>
+          <a:stretch>
+            <a:fillRect/>
+          </a:stretch>
+        </p:blipFill>
+        <p:spPr>
+          <a:prstGeom prst="rect">
+            <a:avLst/>
+          </a:prstGeom>
+        </p:spPr>
+      </p:pic>
       <p:sp>
         <p:nvSpPr>
           <p:cNvPr id="4" name="Text Placeholder 3"/>
@@ -8896,207 +9160,20 @@
           <a:bodyPr/>
           <a:lstStyle/>
           <a:p>
+            <a:r>
+              <a:rPr lang="en-US" dirty="0">
+                <a:hlinkClick r:id="rId3"/>
+              </a:rPr>
+              <a:t>Parking Calculator</a:t>
+            </a:r>
             <a:endParaRPr lang="en-US" dirty="0"/>
-          </a:p>
-        </p:txBody>
-      </p:sp>
-      <p:sp>
-        <p:nvSpPr>
-          <p:cNvPr id="9" name="Rectangle 8"/>
-          <p:cNvSpPr/>
-          <p:nvPr/>
-        </p:nvSpPr>
-        <p:spPr>
-          <a:xfrm>
-            <a:off x="1046285" y="4457699"/>
-            <a:ext cx="2743200" cy="782515"/>
-          </a:xfrm>
-          <a:prstGeom prst="rect">
-            <a:avLst/>
-          </a:prstGeom>
-          <a:solidFill>
-            <a:schemeClr val="bg1">
-              <a:lumMod val="75000"/>
-              <a:lumOff val="25000"/>
-            </a:schemeClr>
-          </a:solidFill>
-        </p:spPr>
-        <p:style>
-          <a:lnRef idx="2">
-            <a:schemeClr val="accent1">
-              <a:shade val="50000"/>
-            </a:schemeClr>
-          </a:lnRef>
-          <a:fillRef idx="1">
-            <a:schemeClr val="accent1"/>
-          </a:fillRef>
-          <a:effectRef idx="0">
-            <a:schemeClr val="accent1"/>
-          </a:effectRef>
-          <a:fontRef idx="minor">
-            <a:schemeClr val="lt1"/>
-          </a:fontRef>
-        </p:style>
-        <p:txBody>
-          <a:bodyPr rtlCol="0" anchor="ctr"/>
-          <a:lstStyle/>
-          <a:p>
-            <a:pPr algn="ctr"/>
-            <a:r>
-              <a:rPr lang="en-US" dirty="0"/>
-              <a:t>Tests</a:t>
-            </a:r>
-          </a:p>
-        </p:txBody>
-      </p:sp>
-      <p:sp>
-        <p:nvSpPr>
-          <p:cNvPr id="10" name="Rectangle 9"/>
-          <p:cNvSpPr/>
-          <p:nvPr/>
-        </p:nvSpPr>
-        <p:spPr>
-          <a:xfrm>
-            <a:off x="1046283" y="3661746"/>
-            <a:ext cx="2743201" cy="787161"/>
-          </a:xfrm>
-          <a:prstGeom prst="rect">
-            <a:avLst/>
-          </a:prstGeom>
-        </p:spPr>
-        <p:style>
-          <a:lnRef idx="2">
-            <a:schemeClr val="accent1">
-              <a:shade val="50000"/>
-            </a:schemeClr>
-          </a:lnRef>
-          <a:fillRef idx="1">
-            <a:schemeClr val="accent1"/>
-          </a:fillRef>
-          <a:effectRef idx="0">
-            <a:schemeClr val="accent1"/>
-          </a:effectRef>
-          <a:fontRef idx="minor">
-            <a:schemeClr val="lt1"/>
-          </a:fontRef>
-        </p:style>
-        <p:txBody>
-          <a:bodyPr rtlCol="0" anchor="ctr"/>
-          <a:lstStyle/>
-          <a:p>
-            <a:r>
-              <a:rPr lang="en-US" dirty="0"/>
-              <a:t>Automation </a:t>
-            </a:r>
-          </a:p>
-          <a:p>
-            <a:r>
-              <a:rPr lang="en-US" dirty="0"/>
-              <a:t>Framework</a:t>
-            </a:r>
-          </a:p>
-        </p:txBody>
-      </p:sp>
-      <p:sp>
-        <p:nvSpPr>
-          <p:cNvPr id="11" name="Rectangle 10"/>
-          <p:cNvSpPr/>
-          <p:nvPr/>
-        </p:nvSpPr>
-        <p:spPr>
-          <a:xfrm>
-            <a:off x="1049213" y="2879231"/>
-            <a:ext cx="2743200" cy="782515"/>
-          </a:xfrm>
-          <a:prstGeom prst="rect">
-            <a:avLst/>
-          </a:prstGeom>
-          <a:solidFill>
-            <a:schemeClr val="accent3">
-              <a:lumMod val="75000"/>
-            </a:schemeClr>
-          </a:solidFill>
-        </p:spPr>
-        <p:style>
-          <a:lnRef idx="2">
-            <a:schemeClr val="accent1">
-              <a:shade val="50000"/>
-            </a:schemeClr>
-          </a:lnRef>
-          <a:fillRef idx="1">
-            <a:schemeClr val="accent1"/>
-          </a:fillRef>
-          <a:effectRef idx="0">
-            <a:schemeClr val="accent1"/>
-          </a:effectRef>
-          <a:fontRef idx="minor">
-            <a:schemeClr val="lt1"/>
-          </a:fontRef>
-        </p:style>
-        <p:txBody>
-          <a:bodyPr rtlCol="0" anchor="ctr"/>
-          <a:lstStyle/>
-          <a:p>
-            <a:pPr algn="ctr"/>
-            <a:r>
-              <a:rPr lang="en-US" dirty="0"/>
-              <a:t>Web Application</a:t>
-            </a:r>
-          </a:p>
-        </p:txBody>
-      </p:sp>
-      <p:sp>
-        <p:nvSpPr>
-          <p:cNvPr id="13" name="Rectangle 12"/>
-          <p:cNvSpPr/>
-          <p:nvPr/>
-        </p:nvSpPr>
-        <p:spPr>
-          <a:xfrm>
-            <a:off x="2548985" y="3782765"/>
-            <a:ext cx="1151793" cy="545122"/>
-          </a:xfrm>
-          <a:prstGeom prst="rect">
-            <a:avLst/>
-          </a:prstGeom>
-          <a:solidFill>
-            <a:schemeClr val="accent4">
-              <a:lumMod val="50000"/>
-            </a:schemeClr>
-          </a:solidFill>
-        </p:spPr>
-        <p:style>
-          <a:lnRef idx="2">
-            <a:schemeClr val="accent1">
-              <a:shade val="50000"/>
-            </a:schemeClr>
-          </a:lnRef>
-          <a:fillRef idx="1">
-            <a:schemeClr val="accent1"/>
-          </a:fillRef>
-          <a:effectRef idx="0">
-            <a:schemeClr val="accent1"/>
-          </a:effectRef>
-          <a:fontRef idx="minor">
-            <a:schemeClr val="lt1"/>
-          </a:fontRef>
-        </p:style>
-        <p:txBody>
-          <a:bodyPr rtlCol="0" anchor="ctr"/>
-          <a:lstStyle/>
-          <a:p>
-            <a:pPr algn="ctr"/>
-            <a:r>
-              <a:rPr lang="en-US" dirty="0"/>
-              <a:t>Selenium</a:t>
-            </a:r>
           </a:p>
         </p:txBody>
       </p:sp>
     </p:spTree>
     <p:extLst>
       <p:ext uri="{BB962C8B-B14F-4D97-AF65-F5344CB8AC3E}">
-        <p14:creationId xmlns:p14="http://schemas.microsoft.com/office/powerpoint/2010/main" val="511482311"/>
+        <p14:creationId xmlns:p14="http://schemas.microsoft.com/office/powerpoint/2010/main" val="2606505764"/>
       </p:ext>
     </p:extLst>
   </p:cSld>
@@ -9123,28 +9200,149 @@
           <a:chExt cx="0" cy="0"/>
         </a:xfrm>
       </p:grpSpPr>
-      <p:sp useBgFill="1">
-        <p:nvSpPr>
-          <p:cNvPr id="7" name="Rectangle 6"/>
-          <p:cNvSpPr>
-            <a:spLocks noGrp="1" noRot="1" noChangeAspect="1" noMove="1" noResize="1" noEditPoints="1" noAdjustHandles="1" noChangeArrowheads="1" noChangeShapeType="1" noTextEdit="1"/>
-          </p:cNvSpPr>
-          <p:nvPr>
-            <p:extLst>
-              <p:ext uri="{386F3935-93C4-4BCD-93E2-E3B085C9AB24}">
-                <p16:designElem xmlns:p16="http://schemas.microsoft.com/office/powerpoint/2015/main" val="1"/>
-              </p:ext>
-            </p:extLst>
-          </p:nvPr>
-        </p:nvSpPr>
-        <p:spPr>
-          <a:xfrm>
-            <a:off x="0" y="-1"/>
-            <a:ext cx="12188824" cy="6858001"/>
+      <p:sp>
+        <p:nvSpPr>
+          <p:cNvPr id="2" name="Title 1"/>
+          <p:cNvSpPr>
+            <a:spLocks noGrp="1"/>
+          </p:cNvSpPr>
+          <p:nvPr>
+            <p:ph type="title"/>
+          </p:nvPr>
+        </p:nvSpPr>
+        <p:spPr/>
+        <p:txBody>
+          <a:bodyPr/>
+          <a:lstStyle/>
+          <a:p>
+            <a:r>
+              <a:rPr lang="en-US" dirty="0"/>
+              <a:t>Architecture</a:t>
+            </a:r>
+          </a:p>
+        </p:txBody>
+      </p:sp>
+      <p:sp>
+        <p:nvSpPr>
+          <p:cNvPr id="3" name="Content Placeholder 2"/>
+          <p:cNvSpPr>
+            <a:spLocks noGrp="1"/>
+          </p:cNvSpPr>
+          <p:nvPr>
+            <p:ph idx="1"/>
+          </p:nvPr>
+        </p:nvSpPr>
+        <p:spPr/>
+        <p:txBody>
+          <a:bodyPr>
+            <a:normAutofit lnSpcReduction="10000"/>
+          </a:bodyPr>
+          <a:lstStyle/>
+          <a:p>
+            <a:r>
+              <a:rPr lang="en-US" dirty="0"/>
+              <a:t>The web application is the SUT.</a:t>
+            </a:r>
+          </a:p>
+          <a:p>
+            <a:endParaRPr lang="en-US" dirty="0"/>
+          </a:p>
+          <a:p>
+            <a:r>
+              <a:rPr lang="en-US" dirty="0"/>
+              <a:t>The Automation Framework is directly tied to Selenium and implements Page Object Model (</a:t>
+            </a:r>
+            <a:r>
+              <a:rPr lang="en-US" b="1" dirty="0"/>
+              <a:t>operations and flows in the UI)</a:t>
+            </a:r>
+            <a:r>
+              <a:rPr lang="en-US" dirty="0"/>
+              <a:t>.</a:t>
+            </a:r>
+          </a:p>
+          <a:p>
+            <a:endParaRPr lang="en-US" dirty="0"/>
+          </a:p>
+          <a:p>
+            <a:r>
+              <a:rPr lang="en-US" dirty="0"/>
+              <a:t>Test cases could use any testing framework (e.g.: </a:t>
+            </a:r>
+            <a:r>
+              <a:rPr lang="en-US" dirty="0" err="1"/>
+              <a:t>Nunit</a:t>
+            </a:r>
+            <a:r>
+              <a:rPr lang="en-US" dirty="0"/>
+              <a:t>, </a:t>
+            </a:r>
+            <a:r>
+              <a:rPr lang="en-US" dirty="0" err="1"/>
+              <a:t>MSTest</a:t>
+            </a:r>
+            <a:r>
+              <a:rPr lang="en-US" dirty="0"/>
+              <a:t>, </a:t>
+            </a:r>
+            <a:r>
+              <a:rPr lang="en-US" dirty="0" err="1"/>
+              <a:t>xUnit</a:t>
+            </a:r>
+            <a:r>
+              <a:rPr lang="en-US" dirty="0"/>
+              <a:t> </a:t>
+            </a:r>
+            <a:r>
+              <a:rPr lang="en-US" dirty="0" err="1"/>
+              <a:t>.Net</a:t>
+            </a:r>
+            <a:r>
+              <a:rPr lang="en-US" dirty="0"/>
+              <a:t>) for verification.</a:t>
+            </a:r>
+          </a:p>
+        </p:txBody>
+      </p:sp>
+      <p:sp>
+        <p:nvSpPr>
+          <p:cNvPr id="4" name="Text Placeholder 3"/>
+          <p:cNvSpPr>
+            <a:spLocks noGrp="1"/>
+          </p:cNvSpPr>
+          <p:nvPr>
+            <p:ph type="body" sz="half" idx="2"/>
+          </p:nvPr>
+        </p:nvSpPr>
+        <p:spPr/>
+        <p:txBody>
+          <a:bodyPr/>
+          <a:lstStyle/>
+          <a:p>
+            <a:endParaRPr lang="en-US" dirty="0"/>
+          </a:p>
+        </p:txBody>
+      </p:sp>
+      <p:sp>
+        <p:nvSpPr>
+          <p:cNvPr id="9" name="Rectangle 8"/>
+          <p:cNvSpPr/>
+          <p:nvPr/>
+        </p:nvSpPr>
+        <p:spPr>
+          <a:xfrm>
+            <a:off x="1046285" y="4457699"/>
+            <a:ext cx="2743200" cy="782515"/>
           </a:xfrm>
           <a:prstGeom prst="rect">
             <a:avLst/>
           </a:prstGeom>
+          <a:solidFill>
+            <a:schemeClr val="bg1">
+              <a:lumMod val="75000"/>
+              <a:lumOff val="25000"/>
+            </a:schemeClr>
+          </a:solidFill>
         </p:spPr>
         <p:style>
           <a:lnRef idx="2">
@@ -9167,72 +9365,27 @@
           <a:lstStyle/>
           <a:p>
             <a:pPr algn="ctr"/>
-            <a:endParaRPr lang="en-US"/>
-          </a:p>
-        </p:txBody>
-      </p:sp>
-      <p:pic>
-        <p:nvPicPr>
-          <p:cNvPr id="8" name="Picture 7"/>
-          <p:cNvPicPr>
-            <a:picLocks noGrp="1" noRot="1" noChangeAspect="1" noMove="1" noResize="1" noEditPoints="1" noAdjustHandles="1" noChangeArrowheads="1" noChangeShapeType="1" noCrop="1"/>
-          </p:cNvPicPr>
-          <p:nvPr>
-            <p:extLst>
-              <p:ext uri="{386F3935-93C4-4BCD-93E2-E3B085C9AB24}">
-                <p16:designElem xmlns:p16="http://schemas.microsoft.com/office/powerpoint/2015/main" val="1"/>
-              </p:ext>
-            </p:extLst>
-          </p:nvPr>
-        </p:nvPicPr>
-        <p:blipFill>
-          <a:blip r:embed="rId2">
-            <a:alphaModFix amt="10000"/>
-            <a:extLst>
-              <a:ext uri="{28A0092B-C50C-407E-A947-70E740481C1C}">
-                <a14:useLocalDpi xmlns:a14="http://schemas.microsoft.com/office/drawing/2010/main" val="0"/>
-              </a:ext>
-            </a:extLst>
-          </a:blip>
-          <a:stretch>
-            <a:fillRect/>
-          </a:stretch>
-        </p:blipFill>
-        <p:spPr>
-          <a:xfrm>
-            <a:off x="-3176" y="0"/>
-            <a:ext cx="12192000" cy="6858000"/>
+            <a:r>
+              <a:rPr lang="en-US" dirty="0"/>
+              <a:t>Tests</a:t>
+            </a:r>
+          </a:p>
+        </p:txBody>
+      </p:sp>
+      <p:sp>
+        <p:nvSpPr>
+          <p:cNvPr id="10" name="Rectangle 9"/>
+          <p:cNvSpPr/>
+          <p:nvPr/>
+        </p:nvSpPr>
+        <p:spPr>
+          <a:xfrm>
+            <a:off x="1046283" y="3661746"/>
+            <a:ext cx="2743201" cy="787161"/>
           </a:xfrm>
           <a:prstGeom prst="rect">
             <a:avLst/>
           </a:prstGeom>
-        </p:spPr>
-      </p:pic>
-      <p:sp>
-        <p:nvSpPr>
-          <p:cNvPr id="9" name="Rectangle 8"/>
-          <p:cNvSpPr>
-            <a:spLocks noGrp="1" noRot="1" noChangeAspect="1" noMove="1" noResize="1" noEditPoints="1" noAdjustHandles="1" noChangeArrowheads="1" noChangeShapeType="1" noTextEdit="1"/>
-          </p:cNvSpPr>
-          <p:nvPr>
-            <p:extLst>
-              <p:ext uri="{386F3935-93C4-4BCD-93E2-E3B085C9AB24}">
-                <p16:designElem xmlns:p16="http://schemas.microsoft.com/office/powerpoint/2015/main" val="1"/>
-              </p:ext>
-            </p:extLst>
-          </p:nvPr>
-        </p:nvSpPr>
-        <p:spPr>
-          <a:xfrm>
-            <a:off x="4639056" y="0"/>
-            <a:ext cx="7552944" cy="6858001"/>
-          </a:xfrm>
-          <a:prstGeom prst="rect">
-            <a:avLst/>
-          </a:prstGeom>
-          <a:ln>
-            <a:noFill/>
-          </a:ln>
         </p:spPr>
         <p:style>
           <a:lnRef idx="2">
@@ -9254,42 +9407,38 @@
           <a:bodyPr rtlCol="0" anchor="ctr"/>
           <a:lstStyle/>
           <a:p>
-            <a:pPr algn="ctr"/>
-            <a:endParaRPr lang="en-US"/>
-          </a:p>
-        </p:txBody>
-      </p:sp>
-      <p:sp>
-        <p:nvSpPr>
-          <p:cNvPr id="10" name="Rectangle 9"/>
-          <p:cNvSpPr>
-            <a:spLocks noGrp="1" noRot="1" noChangeAspect="1" noMove="1" noResize="1" noEditPoints="1" noAdjustHandles="1" noChangeArrowheads="1" noChangeShapeType="1" noTextEdit="1"/>
-          </p:cNvSpPr>
-          <p:nvPr>
-            <p:extLst>
-              <p:ext uri="{386F3935-93C4-4BCD-93E2-E3B085C9AB24}">
-                <p16:designElem xmlns:p16="http://schemas.microsoft.com/office/powerpoint/2015/main" val="1"/>
-              </p:ext>
-            </p:extLst>
-          </p:nvPr>
-        </p:nvSpPr>
-        <p:spPr bwMode="grayWhite">
-          <a:xfrm>
-            <a:off x="2" y="609600"/>
-            <a:ext cx="4959094" cy="1368198"/>
+            <a:r>
+              <a:rPr lang="en-US" dirty="0"/>
+              <a:t>Automation </a:t>
+            </a:r>
+          </a:p>
+          <a:p>
+            <a:r>
+              <a:rPr lang="en-US" dirty="0"/>
+              <a:t>Framework</a:t>
+            </a:r>
+          </a:p>
+        </p:txBody>
+      </p:sp>
+      <p:sp>
+        <p:nvSpPr>
+          <p:cNvPr id="11" name="Rectangle 10"/>
+          <p:cNvSpPr/>
+          <p:nvPr/>
+        </p:nvSpPr>
+        <p:spPr>
+          <a:xfrm>
+            <a:off x="1049213" y="2879231"/>
+            <a:ext cx="2743200" cy="782515"/>
           </a:xfrm>
           <a:prstGeom prst="rect">
             <a:avLst/>
           </a:prstGeom>
           <a:solidFill>
-            <a:schemeClr val="bg1">
-              <a:lumMod val="85000"/>
-              <a:lumOff val="15000"/>
+            <a:schemeClr val="accent3">
+              <a:lumMod val="75000"/>
             </a:schemeClr>
           </a:solidFill>
-          <a:ln>
-            <a:noFill/>
-          </a:ln>
         </p:spPr>
         <p:style>
           <a:lnRef idx="2">
@@ -9307,135 +9456,62 @@
             <a:schemeClr val="lt1"/>
           </a:fontRef>
         </p:style>
-      </p:sp>
-      <p:pic>
-        <p:nvPicPr>
-          <p:cNvPr id="11" name="Picture 10"/>
-          <p:cNvPicPr>
-            <a:picLocks noGrp="1" noRot="1" noChangeAspect="1" noMove="1" noResize="1" noEditPoints="1" noAdjustHandles="1" noChangeArrowheads="1" noChangeShapeType="1" noCrop="1"/>
-          </p:cNvPicPr>
-          <p:nvPr>
-            <p:extLst>
-              <p:ext uri="{386F3935-93C4-4BCD-93E2-E3B085C9AB24}">
-                <p16:designElem xmlns:p16="http://schemas.microsoft.com/office/powerpoint/2015/main" val="1"/>
-              </p:ext>
-            </p:extLst>
-          </p:nvPr>
-        </p:nvPicPr>
-        <p:blipFill>
-          <a:blip r:embed="rId3">
-            <a:extLst>
-              <a:ext uri="{28A0092B-C50C-407E-A947-70E740481C1C}">
-                <a14:useLocalDpi xmlns:a14="http://schemas.microsoft.com/office/drawing/2010/main" val="0"/>
-              </a:ext>
-            </a:extLst>
-          </a:blip>
-          <a:stretch>
-            <a:fillRect/>
-          </a:stretch>
-        </p:blipFill>
-        <p:spPr>
-          <a:xfrm>
-            <a:off x="2" y="1970241"/>
-            <a:ext cx="4956048" cy="199787"/>
+        <p:txBody>
+          <a:bodyPr rtlCol="0" anchor="ctr"/>
+          <a:lstStyle/>
+          <a:p>
+            <a:pPr algn="ctr"/>
+            <a:r>
+              <a:rPr lang="en-US" dirty="0"/>
+              <a:t>Web Application</a:t>
+            </a:r>
+          </a:p>
+        </p:txBody>
+      </p:sp>
+      <p:sp>
+        <p:nvSpPr>
+          <p:cNvPr id="13" name="Rectangle 12"/>
+          <p:cNvSpPr/>
+          <p:nvPr/>
+        </p:nvSpPr>
+        <p:spPr>
+          <a:xfrm>
+            <a:off x="2548985" y="3782765"/>
+            <a:ext cx="1151793" cy="545122"/>
           </a:xfrm>
           <a:prstGeom prst="rect">
             <a:avLst/>
           </a:prstGeom>
-        </p:spPr>
-      </p:pic>
-      <p:pic>
-        <p:nvPicPr>
-          <p:cNvPr id="5" name="Picture 4"/>
-          <p:cNvPicPr>
-            <a:picLocks noChangeAspect="1"/>
-          </p:cNvPicPr>
-          <p:nvPr/>
-        </p:nvPicPr>
-        <p:blipFill>
-          <a:blip r:embed="rId4"/>
-          <a:stretch>
-            <a:fillRect/>
-          </a:stretch>
-        </p:blipFill>
-        <p:spPr>
-          <a:xfrm>
-            <a:off x="5443893" y="640080"/>
-            <a:ext cx="5933872" cy="5577840"/>
-          </a:xfrm>
-          <a:prstGeom prst="rect">
-            <a:avLst/>
-          </a:prstGeom>
-          <a:ln>
-            <a:noFill/>
-          </a:ln>
-          <a:effectLst>
-            <a:outerShdw blurRad="76200" dist="63500" dir="5040000" algn="tl" rotWithShape="0">
-              <a:srgbClr val="000000">
-                <a:alpha val="41000"/>
-              </a:srgbClr>
-            </a:outerShdw>
-          </a:effectLst>
-        </p:spPr>
-      </p:pic>
-      <p:sp>
-        <p:nvSpPr>
-          <p:cNvPr id="2" name="Title 1"/>
-          <p:cNvSpPr>
-            <a:spLocks noGrp="1"/>
-          </p:cNvSpPr>
-          <p:nvPr>
-            <p:ph type="title"/>
-          </p:nvPr>
-        </p:nvSpPr>
-        <p:spPr>
-          <a:xfrm>
-            <a:off x="680321" y="753228"/>
-            <a:ext cx="4136123" cy="1080938"/>
-          </a:xfrm>
-        </p:spPr>
-        <p:txBody>
-          <a:bodyPr>
-            <a:normAutofit/>
-          </a:bodyPr>
+          <a:solidFill>
+            <a:schemeClr val="accent4">
+              <a:lumMod val="50000"/>
+            </a:schemeClr>
+          </a:solidFill>
+        </p:spPr>
+        <p:style>
+          <a:lnRef idx="2">
+            <a:schemeClr val="accent1">
+              <a:shade val="50000"/>
+            </a:schemeClr>
+          </a:lnRef>
+          <a:fillRef idx="1">
+            <a:schemeClr val="accent1"/>
+          </a:fillRef>
+          <a:effectRef idx="0">
+            <a:schemeClr val="accent1"/>
+          </a:effectRef>
+          <a:fontRef idx="minor">
+            <a:schemeClr val="lt1"/>
+          </a:fontRef>
+        </p:style>
+        <p:txBody>
+          <a:bodyPr rtlCol="0" anchor="ctr"/>
           <a:lstStyle/>
           <a:p>
-            <a:r>
-              <a:rPr lang="en-US" sz="2400"/>
-              <a:t>Page Object Model (POM)</a:t>
-            </a:r>
-          </a:p>
-        </p:txBody>
-      </p:sp>
-      <p:sp>
-        <p:nvSpPr>
-          <p:cNvPr id="3" name="Content Placeholder 2"/>
-          <p:cNvSpPr>
-            <a:spLocks noGrp="1"/>
-          </p:cNvSpPr>
-          <p:nvPr>
-            <p:ph idx="1"/>
-          </p:nvPr>
-        </p:nvSpPr>
-        <p:spPr>
-          <a:xfrm>
-            <a:off x="680321" y="2336873"/>
-            <a:ext cx="3656289" cy="3599316"/>
-          </a:xfrm>
-        </p:spPr>
-        <p:txBody>
-          <a:bodyPr>
-            <a:normAutofit/>
-          </a:bodyPr>
-          <a:lstStyle/>
-          <a:p>
-            <a:r>
-              <a:rPr lang="en-US" sz="1800" dirty="0"/>
-              <a:t>It helps to make code more readable, maintainable, and reusable</a:t>
-            </a:r>
-            <a:r>
-              <a:rPr lang="en-US" sz="1400" dirty="0"/>
-              <a:t>.</a:t>
+            <a:pPr algn="ctr"/>
+            <a:r>
+              <a:rPr lang="en-US" dirty="0"/>
+              <a:t>Selenium</a:t>
             </a:r>
           </a:p>
         </p:txBody>
@@ -9443,7 +9519,7 @@
     </p:spTree>
     <p:extLst>
       <p:ext uri="{BB962C8B-B14F-4D97-AF65-F5344CB8AC3E}">
-        <p14:creationId xmlns:p14="http://schemas.microsoft.com/office/powerpoint/2010/main" val="688741842"/>
+        <p14:creationId xmlns:p14="http://schemas.microsoft.com/office/powerpoint/2010/main" val="511482311"/>
       </p:ext>
     </p:extLst>
   </p:cSld>
@@ -9472,7 +9548,7 @@
       </p:grpSpPr>
       <p:sp useBgFill="1">
         <p:nvSpPr>
-          <p:cNvPr id="8" name="Rectangle 7"/>
+          <p:cNvPr id="7" name="Rectangle 6"/>
           <p:cNvSpPr>
             <a:spLocks noGrp="1" noRot="1" noChangeAspect="1" noMove="1" noResize="1" noEditPoints="1" noAdjustHandles="1" noChangeArrowheads="1" noChangeShapeType="1" noTextEdit="1"/>
           </p:cNvSpPr>
@@ -9520,7 +9596,7 @@
       </p:sp>
       <p:pic>
         <p:nvPicPr>
-          <p:cNvPr id="9" name="Picture 8"/>
+          <p:cNvPr id="8" name="Picture 7"/>
           <p:cNvPicPr>
             <a:picLocks noGrp="1" noRot="1" noChangeAspect="1" noMove="1" noResize="1" noEditPoints="1" noAdjustHandles="1" noChangeArrowheads="1" noChangeShapeType="1" noCrop="1"/>
           </p:cNvPicPr>
@@ -9557,7 +9633,7 @@
       </p:pic>
       <p:sp>
         <p:nvSpPr>
-          <p:cNvPr id="10" name="Rectangle 9"/>
+          <p:cNvPr id="9" name="Rectangle 8"/>
           <p:cNvSpPr>
             <a:spLocks noGrp="1" noRot="1" noChangeAspect="1" noMove="1" noResize="1" noEditPoints="1" noAdjustHandles="1" noChangeArrowheads="1" noChangeShapeType="1" noTextEdit="1"/>
           </p:cNvSpPr>
@@ -9608,7 +9684,7 @@
       </p:sp>
       <p:sp>
         <p:nvSpPr>
-          <p:cNvPr id="11" name="Rectangle 10"/>
+          <p:cNvPr id="10" name="Rectangle 9"/>
           <p:cNvSpPr>
             <a:spLocks noGrp="1" noRot="1" noChangeAspect="1" noMove="1" noResize="1" noEditPoints="1" noAdjustHandles="1" noChangeArrowheads="1" noChangeShapeType="1" noTextEdit="1"/>
           </p:cNvSpPr>
@@ -9657,7 +9733,7 @@
       </p:sp>
       <p:pic>
         <p:nvPicPr>
-          <p:cNvPr id="12" name="Picture 11"/>
+          <p:cNvPr id="11" name="Picture 10"/>
           <p:cNvPicPr>
             <a:picLocks noGrp="1" noRot="1" noChangeAspect="1" noMove="1" noResize="1" noEditPoints="1" noAdjustHandles="1" noChangeArrowheads="1" noChangeShapeType="1" noCrop="1"/>
           </p:cNvPicPr>
@@ -9693,7 +9769,7 @@
       </p:pic>
       <p:pic>
         <p:nvPicPr>
-          <p:cNvPr id="6" name="Picture 5"/>
+          <p:cNvPr id="5" name="Picture 4"/>
           <p:cNvPicPr>
             <a:picLocks noChangeAspect="1"/>
           </p:cNvPicPr>
@@ -9707,8 +9783,8 @@
         </p:blipFill>
         <p:spPr>
           <a:xfrm>
-            <a:off x="5276090" y="1678526"/>
-            <a:ext cx="6269479" cy="3500947"/>
+            <a:off x="5443893" y="640080"/>
+            <a:ext cx="5933872" cy="5577840"/>
           </a:xfrm>
           <a:prstGeom prst="rect">
             <a:avLst/>
@@ -9777,16 +9853,48 @@
           <a:lstStyle/>
           <a:p>
             <a:r>
-              <a:rPr lang="en-US" sz="1400"/>
-              <a:t>POM recommends to create a page class for each web page in our web application.  This page class will find the WebElements in the web page and will perform operations on those WebElements.</a:t>
-            </a:r>
+              <a:rPr lang="en-US" sz="1800" dirty="0"/>
+              <a:t>It helps to make code more readable, maintainable, and reusable</a:t>
+            </a:r>
+            <a:r>
+              <a:rPr lang="en-US" sz="1400" dirty="0"/>
+              <a:t>.</a:t>
+            </a:r>
+          </a:p>
+          <a:p>
+            <a:endParaRPr lang="en-US" sz="1400" dirty="0"/>
+          </a:p>
+          <a:p>
+            <a:r>
+              <a:rPr lang="en-US" sz="1400" dirty="0"/>
+              <a:t>POM recommends to create a page class for each web page in our web application.  This page class will find the </a:t>
+            </a:r>
+            <a:r>
+              <a:rPr lang="en-US" sz="1400" dirty="0" err="1"/>
+              <a:t>WebElements</a:t>
+            </a:r>
+            <a:r>
+              <a:rPr lang="en-US" sz="1400" dirty="0"/>
+              <a:t> in the web page and will perform operations on those </a:t>
+            </a:r>
+            <a:r>
+              <a:rPr lang="en-US" sz="1400" dirty="0" err="1"/>
+              <a:t>WebElements</a:t>
+            </a:r>
+            <a:r>
+              <a:rPr lang="en-US" sz="1400" dirty="0"/>
+              <a:t>.</a:t>
+            </a:r>
+          </a:p>
+          <a:p>
+            <a:endParaRPr lang="en-US" sz="1400" dirty="0"/>
           </a:p>
         </p:txBody>
       </p:sp>
     </p:spTree>
     <p:extLst>
       <p:ext uri="{BB962C8B-B14F-4D97-AF65-F5344CB8AC3E}">
-        <p14:creationId xmlns:p14="http://schemas.microsoft.com/office/powerpoint/2010/main" val="2536155245"/>
+        <p14:creationId xmlns:p14="http://schemas.microsoft.com/office/powerpoint/2010/main" val="688741842"/>
       </p:ext>
     </p:extLst>
   </p:cSld>
@@ -10183,8 +10291,28 @@
               <a:t>Page Object Patten says </a:t>
             </a:r>
             <a:r>
-              <a:rPr lang="en-US" b="1" dirty="0"/>
-              <a:t>	should be separated from verification</a:t>
+              <a:rPr lang="en-US" b="1" i="1" dirty="0"/>
+              <a:t>operations and flows</a:t>
+            </a:r>
+            <a:r>
+              <a:rPr lang="en-US" i="1" dirty="0"/>
+              <a:t> in the UI </a:t>
+            </a:r>
+            <a:r>
+              <a:rPr lang="en-US" dirty="0"/>
+              <a:t>should be </a:t>
+            </a:r>
+            <a:r>
+              <a:rPr lang="en-US" b="1" i="1" dirty="0"/>
+              <a:t>separated from</a:t>
+            </a:r>
+            <a:r>
+              <a:rPr lang="en-US" dirty="0"/>
+              <a:t> </a:t>
+            </a:r>
+            <a:r>
+              <a:rPr lang="en-US" b="1" i="1" dirty="0"/>
+              <a:t>verification</a:t>
             </a:r>
             <a:r>
               <a:rPr lang="en-US" dirty="0"/>
@@ -10197,8 +10325,12 @@
               <a:t>Code becomes </a:t>
             </a:r>
             <a:r>
+              <a:rPr lang="en-US" b="1" i="1" dirty="0"/>
+              <a:t>less and optimized</a:t>
+            </a:r>
+            <a:r>
               <a:rPr lang="en-US" b="1" dirty="0"/>
-              <a:t>less and optimized </a:t>
+              <a:t> </a:t>
             </a:r>
             <a:r>
               <a:rPr lang="en-US" dirty="0"/>
@@ -10234,6 +10366,35 @@
           </a:prstGeom>
         </p:spPr>
       </p:pic>
+      <p:sp>
+        <p:nvSpPr>
+          <p:cNvPr id="7" name="TextBox 6"/>
+          <p:cNvSpPr txBox="1"/>
+          <p:nvPr/>
+        </p:nvSpPr>
+        <p:spPr>
+          <a:xfrm>
+            <a:off x="0" y="6312822"/>
+            <a:ext cx="2433358" cy="276999"/>
+          </a:xfrm>
+          <a:prstGeom prst="rect">
+            <a:avLst/>
+          </a:prstGeom>
+          <a:noFill/>
+        </p:spPr>
+        <p:txBody>
+          <a:bodyPr wrap="none" rtlCol="0">
+            <a:spAutoFit/>
+          </a:bodyPr>
+          <a:lstStyle/>
+          <a:p>
+            <a:r>
+              <a:rPr lang="en-US" sz="1200" dirty="0"/>
+              <a:t>Verification is made at test level</a:t>
+            </a:r>
+          </a:p>
+        </p:txBody>
+      </p:sp>
     </p:spTree>
     <p:extLst>
       <p:ext uri="{BB962C8B-B14F-4D97-AF65-F5344CB8AC3E}">

</xml_diff>